<commit_message>
Started Chapter 7 ppt.
</commit_message>
<xml_diff>
--- a/Chapter07-ModellingHumanBehaviour/Chapter7.pptx
+++ b/Chapter07-ModellingHumanBehaviour/Chapter7.pptx
@@ -4,6 +4,9 @@
   <p:sldMasterIdLst>
     <p:sldMasterId id="2147483648" r:id="rId1"/>
   </p:sldMasterIdLst>
+  <p:notesMasterIdLst>
+    <p:notesMasterId r:id="rId3"/>
+  </p:notesMasterIdLst>
   <p:sldIdLst>
     <p:sldId id="256" r:id="rId2"/>
   </p:sldIdLst>
@@ -104,7 +107,483 @@
       </a:defRPr>
     </a:lvl9pPr>
   </p:defaultTextStyle>
+  <p:extLst>
+    <p:ext uri="{EFAFB233-063F-42B5-8137-9DF3F51BA10A}">
+      <p15:sldGuideLst xmlns:p15="http://schemas.microsoft.com/office/powerpoint/2012/main"/>
+    </p:ext>
+  </p:extLst>
 </p:presentation>
+</file>
+
+<file path=ppt/notesMasters/notesMaster1.xml><?xml version="1.0" encoding="utf-8"?>
+<p:notesMaster xmlns:a="http://schemas.openxmlformats.org/drawingml/2006/main" xmlns:r="http://schemas.openxmlformats.org/officeDocument/2006/relationships" xmlns:p="http://schemas.openxmlformats.org/presentationml/2006/main">
+  <p:cSld>
+    <p:bg>
+      <p:bgRef idx="1001">
+        <a:schemeClr val="bg1"/>
+      </p:bgRef>
+    </p:bg>
+    <p:spTree>
+      <p:nvGrpSpPr>
+        <p:cNvPr id="1" name=""/>
+        <p:cNvGrpSpPr/>
+        <p:nvPr/>
+      </p:nvGrpSpPr>
+      <p:grpSpPr>
+        <a:xfrm>
+          <a:off x="0" y="0"/>
+          <a:ext cx="0" cy="0"/>
+          <a:chOff x="0" y="0"/>
+          <a:chExt cx="0" cy="0"/>
+        </a:xfrm>
+      </p:grpSpPr>
+      <p:sp>
+        <p:nvSpPr>
+          <p:cNvPr id="2" name="Header Placeholder 1"/>
+          <p:cNvSpPr>
+            <a:spLocks noGrp="1"/>
+          </p:cNvSpPr>
+          <p:nvPr>
+            <p:ph type="hdr" sz="quarter"/>
+          </p:nvPr>
+        </p:nvSpPr>
+        <p:spPr>
+          <a:xfrm>
+            <a:off x="0" y="0"/>
+            <a:ext cx="2971800" cy="458788"/>
+          </a:xfrm>
+          <a:prstGeom prst="rect">
+            <a:avLst/>
+          </a:prstGeom>
+        </p:spPr>
+        <p:txBody>
+          <a:bodyPr vert="horz" lIns="91440" tIns="45720" rIns="91440" bIns="45720" rtlCol="0"/>
+          <a:lstStyle>
+            <a:lvl1pPr algn="l">
+              <a:defRPr sz="1200"/>
+            </a:lvl1pPr>
+          </a:lstStyle>
+          <a:p>
+            <a:endParaRPr lang="en-US"/>
+          </a:p>
+        </p:txBody>
+      </p:sp>
+      <p:sp>
+        <p:nvSpPr>
+          <p:cNvPr id="3" name="Date Placeholder 2"/>
+          <p:cNvSpPr>
+            <a:spLocks noGrp="1"/>
+          </p:cNvSpPr>
+          <p:nvPr>
+            <p:ph type="dt" idx="1"/>
+          </p:nvPr>
+        </p:nvSpPr>
+        <p:spPr>
+          <a:xfrm>
+            <a:off x="3884613" y="0"/>
+            <a:ext cx="2971800" cy="458788"/>
+          </a:xfrm>
+          <a:prstGeom prst="rect">
+            <a:avLst/>
+          </a:prstGeom>
+        </p:spPr>
+        <p:txBody>
+          <a:bodyPr vert="horz" lIns="91440" tIns="45720" rIns="91440" bIns="45720" rtlCol="0"/>
+          <a:lstStyle>
+            <a:lvl1pPr algn="r">
+              <a:defRPr sz="1200"/>
+            </a:lvl1pPr>
+          </a:lstStyle>
+          <a:p>
+            <a:fld id="{F8ACEDD8-EE01-2547-B7C9-E38E8EE98135}" type="datetimeFigureOut">
+              <a:rPr lang="en-US" smtClean="0"/>
+              <a:t>7/20/18</a:t>
+            </a:fld>
+            <a:endParaRPr lang="en-US"/>
+          </a:p>
+        </p:txBody>
+      </p:sp>
+      <p:sp>
+        <p:nvSpPr>
+          <p:cNvPr id="4" name="Slide Image Placeholder 3"/>
+          <p:cNvSpPr>
+            <a:spLocks noGrp="1" noRot="1" noChangeAspect="1"/>
+          </p:cNvSpPr>
+          <p:nvPr>
+            <p:ph type="sldImg" idx="2"/>
+          </p:nvPr>
+        </p:nvSpPr>
+        <p:spPr>
+          <a:xfrm>
+            <a:off x="685800" y="1143000"/>
+            <a:ext cx="5486400" cy="3086100"/>
+          </a:xfrm>
+          <a:prstGeom prst="rect">
+            <a:avLst/>
+          </a:prstGeom>
+          <a:noFill/>
+          <a:ln w="12700">
+            <a:solidFill>
+              <a:prstClr val="black"/>
+            </a:solidFill>
+          </a:ln>
+        </p:spPr>
+        <p:txBody>
+          <a:bodyPr vert="horz" lIns="91440" tIns="45720" rIns="91440" bIns="45720" rtlCol="0" anchor="ctr"/>
+          <a:lstStyle/>
+          <a:p>
+            <a:endParaRPr lang="en-US"/>
+          </a:p>
+        </p:txBody>
+      </p:sp>
+      <p:sp>
+        <p:nvSpPr>
+          <p:cNvPr id="5" name="Notes Placeholder 4"/>
+          <p:cNvSpPr>
+            <a:spLocks noGrp="1"/>
+          </p:cNvSpPr>
+          <p:nvPr>
+            <p:ph type="body" sz="quarter" idx="3"/>
+          </p:nvPr>
+        </p:nvSpPr>
+        <p:spPr>
+          <a:xfrm>
+            <a:off x="685800" y="4400550"/>
+            <a:ext cx="5486400" cy="3600450"/>
+          </a:xfrm>
+          <a:prstGeom prst="rect">
+            <a:avLst/>
+          </a:prstGeom>
+        </p:spPr>
+        <p:txBody>
+          <a:bodyPr vert="horz" lIns="91440" tIns="45720" rIns="91440" bIns="45720" rtlCol="0"/>
+          <a:lstStyle/>
+          <a:p>
+            <a:pPr lvl="0"/>
+            <a:r>
+              <a:rPr lang="en-US"/>
+              <a:t>Edit Master text styles</a:t>
+            </a:r>
+          </a:p>
+          <a:p>
+            <a:pPr lvl="1"/>
+            <a:r>
+              <a:rPr lang="en-US"/>
+              <a:t>Second level</a:t>
+            </a:r>
+          </a:p>
+          <a:p>
+            <a:pPr lvl="2"/>
+            <a:r>
+              <a:rPr lang="en-US"/>
+              <a:t>Third level</a:t>
+            </a:r>
+          </a:p>
+          <a:p>
+            <a:pPr lvl="3"/>
+            <a:r>
+              <a:rPr lang="en-US"/>
+              <a:t>Fourth level</a:t>
+            </a:r>
+          </a:p>
+          <a:p>
+            <a:pPr lvl="4"/>
+            <a:r>
+              <a:rPr lang="en-US"/>
+              <a:t>Fifth level</a:t>
+            </a:r>
+          </a:p>
+        </p:txBody>
+      </p:sp>
+      <p:sp>
+        <p:nvSpPr>
+          <p:cNvPr id="6" name="Footer Placeholder 5"/>
+          <p:cNvSpPr>
+            <a:spLocks noGrp="1"/>
+          </p:cNvSpPr>
+          <p:nvPr>
+            <p:ph type="ftr" sz="quarter" idx="4"/>
+          </p:nvPr>
+        </p:nvSpPr>
+        <p:spPr>
+          <a:xfrm>
+            <a:off x="0" y="8685213"/>
+            <a:ext cx="2971800" cy="458787"/>
+          </a:xfrm>
+          <a:prstGeom prst="rect">
+            <a:avLst/>
+          </a:prstGeom>
+        </p:spPr>
+        <p:txBody>
+          <a:bodyPr vert="horz" lIns="91440" tIns="45720" rIns="91440" bIns="45720" rtlCol="0" anchor="b"/>
+          <a:lstStyle>
+            <a:lvl1pPr algn="l">
+              <a:defRPr sz="1200"/>
+            </a:lvl1pPr>
+          </a:lstStyle>
+          <a:p>
+            <a:endParaRPr lang="en-US"/>
+          </a:p>
+        </p:txBody>
+      </p:sp>
+      <p:sp>
+        <p:nvSpPr>
+          <p:cNvPr id="7" name="Slide Number Placeholder 6"/>
+          <p:cNvSpPr>
+            <a:spLocks noGrp="1"/>
+          </p:cNvSpPr>
+          <p:nvPr>
+            <p:ph type="sldNum" sz="quarter" idx="5"/>
+          </p:nvPr>
+        </p:nvSpPr>
+        <p:spPr>
+          <a:xfrm>
+            <a:off x="3884613" y="8685213"/>
+            <a:ext cx="2971800" cy="458787"/>
+          </a:xfrm>
+          <a:prstGeom prst="rect">
+            <a:avLst/>
+          </a:prstGeom>
+        </p:spPr>
+        <p:txBody>
+          <a:bodyPr vert="horz" lIns="91440" tIns="45720" rIns="91440" bIns="45720" rtlCol="0" anchor="b"/>
+          <a:lstStyle>
+            <a:lvl1pPr algn="r">
+              <a:defRPr sz="1200"/>
+            </a:lvl1pPr>
+          </a:lstStyle>
+          <a:p>
+            <a:fld id="{43CD079F-D4B9-5549-AC10-BDF83F0E8055}" type="slidenum">
+              <a:rPr lang="en-US" smtClean="0"/>
+              <a:t>‹#›</a:t>
+            </a:fld>
+            <a:endParaRPr lang="en-US"/>
+          </a:p>
+        </p:txBody>
+      </p:sp>
+    </p:spTree>
+    <p:extLst>
+      <p:ext uri="{BB962C8B-B14F-4D97-AF65-F5344CB8AC3E}">
+        <p14:creationId xmlns:p14="http://schemas.microsoft.com/office/powerpoint/2010/main" val="1355775819"/>
+      </p:ext>
+    </p:extLst>
+  </p:cSld>
+  <p:clrMap bg1="lt1" tx1="dk1" bg2="lt2" tx2="dk2" accent1="accent1" accent2="accent2" accent3="accent3" accent4="accent4" accent5="accent5" accent6="accent6" hlink="hlink" folHlink="folHlink"/>
+  <p:notesStyle>
+    <a:lvl1pPr marL="0" algn="l" defTabSz="914400" rtl="0" eaLnBrk="1" latinLnBrk="0" hangingPunct="1">
+      <a:defRPr sz="1200" kern="1200">
+        <a:solidFill>
+          <a:schemeClr val="tx1"/>
+        </a:solidFill>
+        <a:latin typeface="+mn-lt"/>
+        <a:ea typeface="+mn-ea"/>
+        <a:cs typeface="+mn-cs"/>
+      </a:defRPr>
+    </a:lvl1pPr>
+    <a:lvl2pPr marL="457200" algn="l" defTabSz="914400" rtl="0" eaLnBrk="1" latinLnBrk="0" hangingPunct="1">
+      <a:defRPr sz="1200" kern="1200">
+        <a:solidFill>
+          <a:schemeClr val="tx1"/>
+        </a:solidFill>
+        <a:latin typeface="+mn-lt"/>
+        <a:ea typeface="+mn-ea"/>
+        <a:cs typeface="+mn-cs"/>
+      </a:defRPr>
+    </a:lvl2pPr>
+    <a:lvl3pPr marL="914400" algn="l" defTabSz="914400" rtl="0" eaLnBrk="1" latinLnBrk="0" hangingPunct="1">
+      <a:defRPr sz="1200" kern="1200">
+        <a:solidFill>
+          <a:schemeClr val="tx1"/>
+        </a:solidFill>
+        <a:latin typeface="+mn-lt"/>
+        <a:ea typeface="+mn-ea"/>
+        <a:cs typeface="+mn-cs"/>
+      </a:defRPr>
+    </a:lvl3pPr>
+    <a:lvl4pPr marL="1371600" algn="l" defTabSz="914400" rtl="0" eaLnBrk="1" latinLnBrk="0" hangingPunct="1">
+      <a:defRPr sz="1200" kern="1200">
+        <a:solidFill>
+          <a:schemeClr val="tx1"/>
+        </a:solidFill>
+        <a:latin typeface="+mn-lt"/>
+        <a:ea typeface="+mn-ea"/>
+        <a:cs typeface="+mn-cs"/>
+      </a:defRPr>
+    </a:lvl4pPr>
+    <a:lvl5pPr marL="1828800" algn="l" defTabSz="914400" rtl="0" eaLnBrk="1" latinLnBrk="0" hangingPunct="1">
+      <a:defRPr sz="1200" kern="1200">
+        <a:solidFill>
+          <a:schemeClr val="tx1"/>
+        </a:solidFill>
+        <a:latin typeface="+mn-lt"/>
+        <a:ea typeface="+mn-ea"/>
+        <a:cs typeface="+mn-cs"/>
+      </a:defRPr>
+    </a:lvl5pPr>
+    <a:lvl6pPr marL="2286000" algn="l" defTabSz="914400" rtl="0" eaLnBrk="1" latinLnBrk="0" hangingPunct="1">
+      <a:defRPr sz="1200" kern="1200">
+        <a:solidFill>
+          <a:schemeClr val="tx1"/>
+        </a:solidFill>
+        <a:latin typeface="+mn-lt"/>
+        <a:ea typeface="+mn-ea"/>
+        <a:cs typeface="+mn-cs"/>
+      </a:defRPr>
+    </a:lvl6pPr>
+    <a:lvl7pPr marL="2743200" algn="l" defTabSz="914400" rtl="0" eaLnBrk="1" latinLnBrk="0" hangingPunct="1">
+      <a:defRPr sz="1200" kern="1200">
+        <a:solidFill>
+          <a:schemeClr val="tx1"/>
+        </a:solidFill>
+        <a:latin typeface="+mn-lt"/>
+        <a:ea typeface="+mn-ea"/>
+        <a:cs typeface="+mn-cs"/>
+      </a:defRPr>
+    </a:lvl7pPr>
+    <a:lvl8pPr marL="3200400" algn="l" defTabSz="914400" rtl="0" eaLnBrk="1" latinLnBrk="0" hangingPunct="1">
+      <a:defRPr sz="1200" kern="1200">
+        <a:solidFill>
+          <a:schemeClr val="tx1"/>
+        </a:solidFill>
+        <a:latin typeface="+mn-lt"/>
+        <a:ea typeface="+mn-ea"/>
+        <a:cs typeface="+mn-cs"/>
+      </a:defRPr>
+    </a:lvl8pPr>
+    <a:lvl9pPr marL="3657600" algn="l" defTabSz="914400" rtl="0" eaLnBrk="1" latinLnBrk="0" hangingPunct="1">
+      <a:defRPr sz="1200" kern="1200">
+        <a:solidFill>
+          <a:schemeClr val="tx1"/>
+        </a:solidFill>
+        <a:latin typeface="+mn-lt"/>
+        <a:ea typeface="+mn-ea"/>
+        <a:cs typeface="+mn-cs"/>
+      </a:defRPr>
+    </a:lvl9pPr>
+  </p:notesStyle>
+</p:notesMaster>
+</file>
+
+<file path=ppt/notesSlides/notesSlide1.xml><?xml version="1.0" encoding="utf-8"?>
+<p:notes xmlns:a="http://schemas.openxmlformats.org/drawingml/2006/main" xmlns:r="http://schemas.openxmlformats.org/officeDocument/2006/relationships" xmlns:p="http://schemas.openxmlformats.org/presentationml/2006/main">
+  <p:cSld>
+    <p:spTree>
+      <p:nvGrpSpPr>
+        <p:cNvPr id="1" name=""/>
+        <p:cNvGrpSpPr/>
+        <p:nvPr/>
+      </p:nvGrpSpPr>
+      <p:grpSpPr>
+        <a:xfrm>
+          <a:off x="0" y="0"/>
+          <a:ext cx="0" cy="0"/>
+          <a:chOff x="0" y="0"/>
+          <a:chExt cx="0" cy="0"/>
+        </a:xfrm>
+      </p:grpSpPr>
+      <p:sp>
+        <p:nvSpPr>
+          <p:cNvPr id="2" name="Slide Image Placeholder 1"/>
+          <p:cNvSpPr>
+            <a:spLocks noGrp="1" noRot="1" noChangeAspect="1"/>
+          </p:cNvSpPr>
+          <p:nvPr>
+            <p:ph type="sldImg"/>
+          </p:nvPr>
+        </p:nvSpPr>
+        <p:spPr/>
+      </p:sp>
+      <p:sp>
+        <p:nvSpPr>
+          <p:cNvPr id="3" name="Notes Placeholder 2"/>
+          <p:cNvSpPr>
+            <a:spLocks noGrp="1"/>
+          </p:cNvSpPr>
+          <p:nvPr>
+            <p:ph type="body" idx="1"/>
+          </p:nvPr>
+        </p:nvSpPr>
+        <p:spPr/>
+        <p:txBody>
+          <a:bodyPr/>
+          <a:lstStyle/>
+          <a:p>
+            <a:r>
+              <a:rPr lang="en-US" dirty="0"/>
+              <a:t>This chapter explores the most common approaches by which researchers incorporate human </a:t>
+            </a:r>
+            <a:r>
+              <a:rPr lang="en-US" dirty="0" err="1"/>
+              <a:t>behaviour</a:t>
+            </a:r>
+            <a:r>
+              <a:rPr lang="en-US" dirty="0"/>
+              <a:t> into agent-based models. We explain why it can be necessary to model human </a:t>
+            </a:r>
+            <a:r>
+              <a:rPr lang="en-US" dirty="0" err="1"/>
+              <a:t>behaviour</a:t>
+            </a:r>
+            <a:r>
+              <a:rPr lang="en-US" dirty="0"/>
+              <a:t> and the main considerations that the researcher needs to be aware of when developing an agent-based model.  From this, we present an overview of the two main broad approaches, mathematical and conceptual cognitive models when it comes to modelling human </a:t>
+            </a:r>
+            <a:r>
+              <a:rPr lang="en-US" dirty="0" err="1"/>
+              <a:t>behaviour</a:t>
+            </a:r>
+            <a:r>
+              <a:rPr lang="en-US" dirty="0"/>
+              <a:t> in agent-based models.  We supplement this discussion with two case-studies that provide examples of how these approaches can be implemented, both examples have the model code available that can be downloaded and experimented with. The chapter finishes with a discussion of some of the thorny issues that researchers need to be aware of when attempting to simulate </a:t>
+            </a:r>
+            <a:r>
+              <a:rPr lang="en-US" dirty="0" err="1"/>
+              <a:t>behaviour</a:t>
+            </a:r>
+            <a:r>
+              <a:rPr lang="en-US" dirty="0"/>
+              <a:t> within agent-based models.</a:t>
+            </a:r>
+          </a:p>
+          <a:p>
+            <a:endParaRPr lang="en-US" dirty="0"/>
+          </a:p>
+        </p:txBody>
+      </p:sp>
+      <p:sp>
+        <p:nvSpPr>
+          <p:cNvPr id="4" name="Slide Number Placeholder 3"/>
+          <p:cNvSpPr>
+            <a:spLocks noGrp="1"/>
+          </p:cNvSpPr>
+          <p:nvPr>
+            <p:ph type="sldNum" sz="quarter" idx="10"/>
+          </p:nvPr>
+        </p:nvSpPr>
+        <p:spPr/>
+        <p:txBody>
+          <a:bodyPr/>
+          <a:lstStyle/>
+          <a:p>
+            <a:fld id="{43CD079F-D4B9-5549-AC10-BDF83F0E8055}" type="slidenum">
+              <a:rPr lang="en-US" smtClean="0"/>
+              <a:t>1</a:t>
+            </a:fld>
+            <a:endParaRPr lang="en-US"/>
+          </a:p>
+        </p:txBody>
+      </p:sp>
+    </p:spTree>
+    <p:extLst>
+      <p:ext uri="{BB962C8B-B14F-4D97-AF65-F5344CB8AC3E}">
+        <p14:creationId xmlns:p14="http://schemas.microsoft.com/office/powerpoint/2010/main" val="140864955"/>
+      </p:ext>
+    </p:extLst>
+  </p:cSld>
+  <p:clrMapOvr>
+    <a:masterClrMapping/>
+  </p:clrMapOvr>
+</p:notes>
 </file>
 
 <file path=ppt/slideLayouts/slideLayout1.xml><?xml version="1.0" encoding="utf-8"?>
@@ -254,7 +733,7 @@
           <a:p>
             <a:fld id="{53326AB7-C146-8643-AC32-1D896C71A7F3}" type="datetimeFigureOut">
               <a:rPr lang="en-US" smtClean="0"/>
-              <a:t>7/16/18</a:t>
+              <a:t>7/20/18</a:t>
             </a:fld>
             <a:endParaRPr lang="en-US"/>
           </a:p>
@@ -452,7 +931,7 @@
           <a:p>
             <a:fld id="{53326AB7-C146-8643-AC32-1D896C71A7F3}" type="datetimeFigureOut">
               <a:rPr lang="en-US" smtClean="0"/>
-              <a:t>7/16/18</a:t>
+              <a:t>7/20/18</a:t>
             </a:fld>
             <a:endParaRPr lang="en-US"/>
           </a:p>
@@ -660,7 +1139,7 @@
           <a:p>
             <a:fld id="{53326AB7-C146-8643-AC32-1D896C71A7F3}" type="datetimeFigureOut">
               <a:rPr lang="en-US" smtClean="0"/>
-              <a:t>7/16/18</a:t>
+              <a:t>7/20/18</a:t>
             </a:fld>
             <a:endParaRPr lang="en-US"/>
           </a:p>
@@ -858,7 +1337,7 @@
           <a:p>
             <a:fld id="{53326AB7-C146-8643-AC32-1D896C71A7F3}" type="datetimeFigureOut">
               <a:rPr lang="en-US" smtClean="0"/>
-              <a:t>7/16/18</a:t>
+              <a:t>7/20/18</a:t>
             </a:fld>
             <a:endParaRPr lang="en-US"/>
           </a:p>
@@ -1133,7 +1612,7 @@
           <a:p>
             <a:fld id="{53326AB7-C146-8643-AC32-1D896C71A7F3}" type="datetimeFigureOut">
               <a:rPr lang="en-US" smtClean="0"/>
-              <a:t>7/16/18</a:t>
+              <a:t>7/20/18</a:t>
             </a:fld>
             <a:endParaRPr lang="en-US"/>
           </a:p>
@@ -1398,7 +1877,7 @@
           <a:p>
             <a:fld id="{53326AB7-C146-8643-AC32-1D896C71A7F3}" type="datetimeFigureOut">
               <a:rPr lang="en-US" smtClean="0"/>
-              <a:t>7/16/18</a:t>
+              <a:t>7/20/18</a:t>
             </a:fld>
             <a:endParaRPr lang="en-US"/>
           </a:p>
@@ -1810,7 +2289,7 @@
           <a:p>
             <a:fld id="{53326AB7-C146-8643-AC32-1D896C71A7F3}" type="datetimeFigureOut">
               <a:rPr lang="en-US" smtClean="0"/>
-              <a:t>7/16/18</a:t>
+              <a:t>7/20/18</a:t>
             </a:fld>
             <a:endParaRPr lang="en-US"/>
           </a:p>
@@ -1951,7 +2430,7 @@
           <a:p>
             <a:fld id="{53326AB7-C146-8643-AC32-1D896C71A7F3}" type="datetimeFigureOut">
               <a:rPr lang="en-US" smtClean="0"/>
-              <a:t>7/16/18</a:t>
+              <a:t>7/20/18</a:t>
             </a:fld>
             <a:endParaRPr lang="en-US"/>
           </a:p>
@@ -2064,7 +2543,7 @@
           <a:p>
             <a:fld id="{53326AB7-C146-8643-AC32-1D896C71A7F3}" type="datetimeFigureOut">
               <a:rPr lang="en-US" smtClean="0"/>
-              <a:t>7/16/18</a:t>
+              <a:t>7/20/18</a:t>
             </a:fld>
             <a:endParaRPr lang="en-US"/>
           </a:p>
@@ -2375,7 +2854,7 @@
           <a:p>
             <a:fld id="{53326AB7-C146-8643-AC32-1D896C71A7F3}" type="datetimeFigureOut">
               <a:rPr lang="en-US" smtClean="0"/>
-              <a:t>7/16/18</a:t>
+              <a:t>7/20/18</a:t>
             </a:fld>
             <a:endParaRPr lang="en-US"/>
           </a:p>
@@ -2663,7 +3142,7 @@
           <a:p>
             <a:fld id="{53326AB7-C146-8643-AC32-1D896C71A7F3}" type="datetimeFigureOut">
               <a:rPr lang="en-US" smtClean="0"/>
-              <a:t>7/16/18</a:t>
+              <a:t>7/20/18</a:t>
             </a:fld>
             <a:endParaRPr lang="en-US"/>
           </a:p>
@@ -2904,7 +3383,7 @@
           <a:p>
             <a:fld id="{53326AB7-C146-8643-AC32-1D896C71A7F3}" type="datetimeFigureOut">
               <a:rPr lang="en-US" smtClean="0"/>
-              <a:t>7/16/18</a:t>
+              <a:t>7/20/18</a:t>
             </a:fld>
             <a:endParaRPr lang="en-US"/>
           </a:p>
@@ -3342,7 +3821,10 @@
           <a:bodyPr/>
           <a:lstStyle/>
           <a:p>
-            <a:endParaRPr lang="en-US"/>
+            <a:r>
+              <a:rPr lang="en-US" dirty="0"/>
+              <a:t>Chapter 7</a:t>
+            </a:r>
           </a:p>
         </p:txBody>
       </p:sp>
@@ -3367,7 +3849,10 @@
           <a:bodyPr/>
           <a:lstStyle/>
           <a:p>
-            <a:endParaRPr lang="en-US"/>
+            <a:r>
+              <a:rPr lang="en-US" dirty="0"/>
+              <a:t>Modelling Human Behavior</a:t>
+            </a:r>
           </a:p>
         </p:txBody>
       </p:sp>
@@ -3677,4 +4162,299 @@
     </a:ext>
   </a:extLst>
 </a:theme>
+</file>
+
+<file path=ppt/theme/theme2.xml><?xml version="1.0" encoding="utf-8"?>
+<a:theme xmlns:a="http://schemas.openxmlformats.org/drawingml/2006/main" name="Office Theme">
+  <a:themeElements>
+    <a:clrScheme name="Office">
+      <a:dk1>
+        <a:sysClr val="windowText" lastClr="000000"/>
+      </a:dk1>
+      <a:lt1>
+        <a:sysClr val="window" lastClr="FFFFFF"/>
+      </a:lt1>
+      <a:dk2>
+        <a:srgbClr val="44546A"/>
+      </a:dk2>
+      <a:lt2>
+        <a:srgbClr val="E7E6E6"/>
+      </a:lt2>
+      <a:accent1>
+        <a:srgbClr val="4472C4"/>
+      </a:accent1>
+      <a:accent2>
+        <a:srgbClr val="ED7D31"/>
+      </a:accent2>
+      <a:accent3>
+        <a:srgbClr val="A5A5A5"/>
+      </a:accent3>
+      <a:accent4>
+        <a:srgbClr val="FFC000"/>
+      </a:accent4>
+      <a:accent5>
+        <a:srgbClr val="5B9BD5"/>
+      </a:accent5>
+      <a:accent6>
+        <a:srgbClr val="70AD47"/>
+      </a:accent6>
+      <a:hlink>
+        <a:srgbClr val="0563C1"/>
+      </a:hlink>
+      <a:folHlink>
+        <a:srgbClr val="954F72"/>
+      </a:folHlink>
+    </a:clrScheme>
+    <a:fontScheme name="Office">
+      <a:majorFont>
+        <a:latin typeface="Calibri Light" panose="020F0302020204030204"/>
+        <a:ea typeface=""/>
+        <a:cs typeface=""/>
+        <a:font script="Jpan" typeface="游ゴシック Light"/>
+        <a:font script="Hang" typeface="맑은 고딕"/>
+        <a:font script="Hans" typeface="等线 Light"/>
+        <a:font script="Hant" typeface="新細明體"/>
+        <a:font script="Arab" typeface="Times New Roman"/>
+        <a:font script="Hebr" typeface="Times New Roman"/>
+        <a:font script="Thai" typeface="Angsana New"/>
+        <a:font script="Ethi" typeface="Nyala"/>
+        <a:font script="Beng" typeface="Vrinda"/>
+        <a:font script="Gujr" typeface="Shruti"/>
+        <a:font script="Khmr" typeface="MoolBoran"/>
+        <a:font script="Knda" typeface="Tunga"/>
+        <a:font script="Guru" typeface="Raavi"/>
+        <a:font script="Cans" typeface="Euphemia"/>
+        <a:font script="Cher" typeface="Plantagenet Cherokee"/>
+        <a:font script="Yiii" typeface="Microsoft Yi Baiti"/>
+        <a:font script="Tibt" typeface="Microsoft Himalaya"/>
+        <a:font script="Thaa" typeface="MV Boli"/>
+        <a:font script="Deva" typeface="Mangal"/>
+        <a:font script="Telu" typeface="Gautami"/>
+        <a:font script="Taml" typeface="Latha"/>
+        <a:font script="Syrc" typeface="Estrangelo Edessa"/>
+        <a:font script="Orya" typeface="Kalinga"/>
+        <a:font script="Mlym" typeface="Kartika"/>
+        <a:font script="Laoo" typeface="DokChampa"/>
+        <a:font script="Sinh" typeface="Iskoola Pota"/>
+        <a:font script="Mong" typeface="Mongolian Baiti"/>
+        <a:font script="Viet" typeface="Times New Roman"/>
+        <a:font script="Uigh" typeface="Microsoft Uighur"/>
+        <a:font script="Geor" typeface="Sylfaen"/>
+        <a:font script="Armn" typeface="Arial"/>
+        <a:font script="Bugi" typeface="Leelawadee UI"/>
+        <a:font script="Bopo" typeface="Microsoft JhengHei"/>
+        <a:font script="Java" typeface="Javanese Text"/>
+        <a:font script="Lisu" typeface="Segoe UI"/>
+        <a:font script="Mymr" typeface="Myanmar Text"/>
+        <a:font script="Nkoo" typeface="Ebrima"/>
+        <a:font script="Olck" typeface="Nirmala UI"/>
+        <a:font script="Osma" typeface="Ebrima"/>
+        <a:font script="Phag" typeface="Phagspa"/>
+        <a:font script="Syrn" typeface="Estrangelo Edessa"/>
+        <a:font script="Syrj" typeface="Estrangelo Edessa"/>
+        <a:font script="Syre" typeface="Estrangelo Edessa"/>
+        <a:font script="Sora" typeface="Nirmala UI"/>
+        <a:font script="Tale" typeface="Microsoft Tai Le"/>
+        <a:font script="Talu" typeface="Microsoft New Tai Lue"/>
+        <a:font script="Tfng" typeface="Ebrima"/>
+      </a:majorFont>
+      <a:minorFont>
+        <a:latin typeface="Calibri" panose="020F0502020204030204"/>
+        <a:ea typeface=""/>
+        <a:cs typeface=""/>
+        <a:font script="Jpan" typeface="游ゴシック"/>
+        <a:font script="Hang" typeface="맑은 고딕"/>
+        <a:font script="Hans" typeface="等线"/>
+        <a:font script="Hant" typeface="新細明體"/>
+        <a:font script="Arab" typeface="Arial"/>
+        <a:font script="Hebr" typeface="Arial"/>
+        <a:font script="Thai" typeface="Cordia New"/>
+        <a:font script="Ethi" typeface="Nyala"/>
+        <a:font script="Beng" typeface="Vrinda"/>
+        <a:font script="Gujr" typeface="Shruti"/>
+        <a:font script="Khmr" typeface="DaunPenh"/>
+        <a:font script="Knda" typeface="Tunga"/>
+        <a:font script="Guru" typeface="Raavi"/>
+        <a:font script="Cans" typeface="Euphemia"/>
+        <a:font script="Cher" typeface="Plantagenet Cherokee"/>
+        <a:font script="Yiii" typeface="Microsoft Yi Baiti"/>
+        <a:font script="Tibt" typeface="Microsoft Himalaya"/>
+        <a:font script="Thaa" typeface="MV Boli"/>
+        <a:font script="Deva" typeface="Mangal"/>
+        <a:font script="Telu" typeface="Gautami"/>
+        <a:font script="Taml" typeface="Latha"/>
+        <a:font script="Syrc" typeface="Estrangelo Edessa"/>
+        <a:font script="Orya" typeface="Kalinga"/>
+        <a:font script="Mlym" typeface="Kartika"/>
+        <a:font script="Laoo" typeface="DokChampa"/>
+        <a:font script="Sinh" typeface="Iskoola Pota"/>
+        <a:font script="Mong" typeface="Mongolian Baiti"/>
+        <a:font script="Viet" typeface="Arial"/>
+        <a:font script="Uigh" typeface="Microsoft Uighur"/>
+        <a:font script="Geor" typeface="Sylfaen"/>
+        <a:font script="Armn" typeface="Arial"/>
+        <a:font script="Bugi" typeface="Leelawadee UI"/>
+        <a:font script="Bopo" typeface="Microsoft JhengHei"/>
+        <a:font script="Java" typeface="Javanese Text"/>
+        <a:font script="Lisu" typeface="Segoe UI"/>
+        <a:font script="Mymr" typeface="Myanmar Text"/>
+        <a:font script="Nkoo" typeface="Ebrima"/>
+        <a:font script="Olck" typeface="Nirmala UI"/>
+        <a:font script="Osma" typeface="Ebrima"/>
+        <a:font script="Phag" typeface="Phagspa"/>
+        <a:font script="Syrn" typeface="Estrangelo Edessa"/>
+        <a:font script="Syrj" typeface="Estrangelo Edessa"/>
+        <a:font script="Syre" typeface="Estrangelo Edessa"/>
+        <a:font script="Sora" typeface="Nirmala UI"/>
+        <a:font script="Tale" typeface="Microsoft Tai Le"/>
+        <a:font script="Talu" typeface="Microsoft New Tai Lue"/>
+        <a:font script="Tfng" typeface="Ebrima"/>
+      </a:minorFont>
+    </a:fontScheme>
+    <a:fmtScheme name="Office">
+      <a:fillStyleLst>
+        <a:solidFill>
+          <a:schemeClr val="phClr"/>
+        </a:solidFill>
+        <a:gradFill rotWithShape="1">
+          <a:gsLst>
+            <a:gs pos="0">
+              <a:schemeClr val="phClr">
+                <a:lumMod val="110000"/>
+                <a:satMod val="105000"/>
+                <a:tint val="67000"/>
+              </a:schemeClr>
+            </a:gs>
+            <a:gs pos="50000">
+              <a:schemeClr val="phClr">
+                <a:lumMod val="105000"/>
+                <a:satMod val="103000"/>
+                <a:tint val="73000"/>
+              </a:schemeClr>
+            </a:gs>
+            <a:gs pos="100000">
+              <a:schemeClr val="phClr">
+                <a:lumMod val="105000"/>
+                <a:satMod val="109000"/>
+                <a:tint val="81000"/>
+              </a:schemeClr>
+            </a:gs>
+          </a:gsLst>
+          <a:lin ang="5400000" scaled="0"/>
+        </a:gradFill>
+        <a:gradFill rotWithShape="1">
+          <a:gsLst>
+            <a:gs pos="0">
+              <a:schemeClr val="phClr">
+                <a:satMod val="103000"/>
+                <a:lumMod val="102000"/>
+                <a:tint val="94000"/>
+              </a:schemeClr>
+            </a:gs>
+            <a:gs pos="50000">
+              <a:schemeClr val="phClr">
+                <a:satMod val="110000"/>
+                <a:lumMod val="100000"/>
+                <a:shade val="100000"/>
+              </a:schemeClr>
+            </a:gs>
+            <a:gs pos="100000">
+              <a:schemeClr val="phClr">
+                <a:lumMod val="99000"/>
+                <a:satMod val="120000"/>
+                <a:shade val="78000"/>
+              </a:schemeClr>
+            </a:gs>
+          </a:gsLst>
+          <a:lin ang="5400000" scaled="0"/>
+        </a:gradFill>
+      </a:fillStyleLst>
+      <a:lnStyleLst>
+        <a:ln w="6350" cap="flat" cmpd="sng" algn="ctr">
+          <a:solidFill>
+            <a:schemeClr val="phClr"/>
+          </a:solidFill>
+          <a:prstDash val="solid"/>
+          <a:miter lim="800000"/>
+        </a:ln>
+        <a:ln w="12700" cap="flat" cmpd="sng" algn="ctr">
+          <a:solidFill>
+            <a:schemeClr val="phClr"/>
+          </a:solidFill>
+          <a:prstDash val="solid"/>
+          <a:miter lim="800000"/>
+        </a:ln>
+        <a:ln w="19050" cap="flat" cmpd="sng" algn="ctr">
+          <a:solidFill>
+            <a:schemeClr val="phClr"/>
+          </a:solidFill>
+          <a:prstDash val="solid"/>
+          <a:miter lim="800000"/>
+        </a:ln>
+      </a:lnStyleLst>
+      <a:effectStyleLst>
+        <a:effectStyle>
+          <a:effectLst/>
+        </a:effectStyle>
+        <a:effectStyle>
+          <a:effectLst/>
+        </a:effectStyle>
+        <a:effectStyle>
+          <a:effectLst>
+            <a:outerShdw blurRad="57150" dist="19050" dir="5400000" algn="ctr" rotWithShape="0">
+              <a:srgbClr val="000000">
+                <a:alpha val="63000"/>
+              </a:srgbClr>
+            </a:outerShdw>
+          </a:effectLst>
+        </a:effectStyle>
+      </a:effectStyleLst>
+      <a:bgFillStyleLst>
+        <a:solidFill>
+          <a:schemeClr val="phClr"/>
+        </a:solidFill>
+        <a:solidFill>
+          <a:schemeClr val="phClr">
+            <a:tint val="95000"/>
+            <a:satMod val="170000"/>
+          </a:schemeClr>
+        </a:solidFill>
+        <a:gradFill rotWithShape="1">
+          <a:gsLst>
+            <a:gs pos="0">
+              <a:schemeClr val="phClr">
+                <a:tint val="93000"/>
+                <a:satMod val="150000"/>
+                <a:shade val="98000"/>
+                <a:lumMod val="102000"/>
+              </a:schemeClr>
+            </a:gs>
+            <a:gs pos="50000">
+              <a:schemeClr val="phClr">
+                <a:tint val="98000"/>
+                <a:satMod val="130000"/>
+                <a:shade val="90000"/>
+                <a:lumMod val="103000"/>
+              </a:schemeClr>
+            </a:gs>
+            <a:gs pos="100000">
+              <a:schemeClr val="phClr">
+                <a:shade val="63000"/>
+                <a:satMod val="120000"/>
+              </a:schemeClr>
+            </a:gs>
+          </a:gsLst>
+          <a:lin ang="5400000" scaled="0"/>
+        </a:gradFill>
+      </a:bgFillStyleLst>
+    </a:fmtScheme>
+  </a:themeElements>
+  <a:objectDefaults/>
+  <a:extraClrSchemeLst/>
+  <a:extLst>
+    <a:ext uri="{05A4C25C-085E-4340-85A3-A5531E510DB2}">
+      <thm15:themeFamily xmlns:thm15="http://schemas.microsoft.com/office/thememl/2012/main" name="Office Theme" id="{62F939B6-93AF-4DB8-9C6B-D6C7DFDC589F}" vid="{4A3C46E8-61CC-4603-A589-7422A47A8E4A}"/>
+    </a:ext>
+  </a:extLst>
+</a:theme>
 </file>
</xml_diff>

<commit_message>
Add figues and tables to Chapter 7
</commit_message>
<xml_diff>
--- a/Chapter07-ModellingHumanBehaviour/Chapter7.pptx
+++ b/Chapter07-ModellingHumanBehaviour/Chapter7.pptx
@@ -5,12 +5,20 @@
     <p:sldMasterId id="2147483648" r:id="rId1"/>
   </p:sldMasterIdLst>
   <p:notesMasterIdLst>
-    <p:notesMasterId r:id="rId5"/>
+    <p:notesMasterId r:id="rId13"/>
   </p:notesMasterIdLst>
   <p:sldIdLst>
     <p:sldId id="256" r:id="rId2"/>
     <p:sldId id="277" r:id="rId3"/>
     <p:sldId id="271" r:id="rId4"/>
+    <p:sldId id="278" r:id="rId5"/>
+    <p:sldId id="283" r:id="rId6"/>
+    <p:sldId id="284" r:id="rId7"/>
+    <p:sldId id="279" r:id="rId8"/>
+    <p:sldId id="280" r:id="rId9"/>
+    <p:sldId id="282" r:id="rId10"/>
+    <p:sldId id="281" r:id="rId11"/>
+    <p:sldId id="285" r:id="rId12"/>
   </p:sldIdLst>
   <p:sldSz cx="12192000" cy="6858000"/>
   <p:notesSz cx="6858000" cy="9144000"/>
@@ -199,7 +207,7 @@
           <a:p>
             <a:fld id="{F8ACEDD8-EE01-2547-B7C9-E38E8EE98135}" type="datetimeFigureOut">
               <a:rPr lang="en-US" smtClean="0"/>
-              <a:t>11/6/18</a:t>
+              <a:t>12/16/19</a:t>
             </a:fld>
             <a:endParaRPr lang="en-US"/>
           </a:p>
@@ -588,6 +596,319 @@
 </p:notes>
 </file>
 
+<file path=ppt/notesSlides/notesSlide2.xml><?xml version="1.0" encoding="utf-8"?>
+<p:notes xmlns:a="http://schemas.openxmlformats.org/drawingml/2006/main" xmlns:r="http://schemas.openxmlformats.org/officeDocument/2006/relationships" xmlns:p="http://schemas.openxmlformats.org/presentationml/2006/main">
+  <p:cSld>
+    <p:spTree>
+      <p:nvGrpSpPr>
+        <p:cNvPr id="1" name=""/>
+        <p:cNvGrpSpPr/>
+        <p:nvPr/>
+      </p:nvGrpSpPr>
+      <p:grpSpPr>
+        <a:xfrm>
+          <a:off x="0" y="0"/>
+          <a:ext cx="0" cy="0"/>
+          <a:chOff x="0" y="0"/>
+          <a:chExt cx="0" cy="0"/>
+        </a:xfrm>
+      </p:grpSpPr>
+      <p:sp>
+        <p:nvSpPr>
+          <p:cNvPr id="2" name="Slide Image Placeholder 1"/>
+          <p:cNvSpPr>
+            <a:spLocks noGrp="1" noRot="1" noChangeAspect="1"/>
+          </p:cNvSpPr>
+          <p:nvPr>
+            <p:ph type="sldImg"/>
+          </p:nvPr>
+        </p:nvSpPr>
+        <p:spPr/>
+      </p:sp>
+      <p:sp>
+        <p:nvSpPr>
+          <p:cNvPr id="3" name="Notes Placeholder 2"/>
+          <p:cNvSpPr>
+            <a:spLocks noGrp="1"/>
+          </p:cNvSpPr>
+          <p:nvPr>
+            <p:ph type="body" idx="1"/>
+          </p:nvPr>
+        </p:nvSpPr>
+        <p:spPr/>
+        <p:txBody>
+          <a:bodyPr/>
+          <a:lstStyle/>
+          <a:p>
+            <a:r>
+              <a:rPr lang="en-US" sz="1200" b="1" kern="1200" dirty="0">
+                <a:solidFill>
+                  <a:schemeClr val="tx1"/>
+                </a:solidFill>
+                <a:effectLst/>
+                <a:latin typeface="+mn-lt"/>
+                <a:ea typeface="+mn-ea"/>
+                <a:cs typeface="+mn-cs"/>
+              </a:rPr>
+              <a:t>Figure 7.1 </a:t>
+            </a:r>
+            <a:r>
+              <a:rPr lang="en-US" sz="1200" kern="1200" dirty="0" err="1">
+                <a:solidFill>
+                  <a:schemeClr val="tx1"/>
+                </a:solidFill>
+                <a:effectLst/>
+                <a:latin typeface="+mn-lt"/>
+                <a:ea typeface="+mn-ea"/>
+                <a:cs typeface="+mn-cs"/>
+              </a:rPr>
+              <a:t>Behavioural</a:t>
+            </a:r>
+            <a:r>
+              <a:rPr lang="en-US" sz="1200" kern="1200" dirty="0">
+                <a:solidFill>
+                  <a:schemeClr val="tx1"/>
+                </a:solidFill>
+                <a:effectLst/>
+                <a:latin typeface="+mn-lt"/>
+                <a:ea typeface="+mn-ea"/>
+                <a:cs typeface="+mn-cs"/>
+              </a:rPr>
+              <a:t> complexity plotted against environmental complexity for selected</a:t>
+            </a:r>
+          </a:p>
+          <a:p>
+            <a:r>
+              <a:rPr lang="en-US" sz="1200" kern="1200" dirty="0">
+                <a:solidFill>
+                  <a:schemeClr val="tx1"/>
+                </a:solidFill>
+                <a:effectLst/>
+                <a:latin typeface="+mn-lt"/>
+                <a:ea typeface="+mn-ea"/>
+                <a:cs typeface="+mn-cs"/>
+              </a:rPr>
+              <a:t>applications</a:t>
+            </a:r>
+          </a:p>
+          <a:p>
+            <a:endParaRPr lang="en-US" dirty="0"/>
+          </a:p>
+        </p:txBody>
+      </p:sp>
+      <p:sp>
+        <p:nvSpPr>
+          <p:cNvPr id="4" name="Slide Number Placeholder 3"/>
+          <p:cNvSpPr>
+            <a:spLocks noGrp="1"/>
+          </p:cNvSpPr>
+          <p:nvPr>
+            <p:ph type="sldNum" sz="quarter" idx="5"/>
+          </p:nvPr>
+        </p:nvSpPr>
+        <p:spPr/>
+        <p:txBody>
+          <a:bodyPr/>
+          <a:lstStyle/>
+          <a:p>
+            <a:fld id="{43CD079F-D4B9-5549-AC10-BDF83F0E8055}" type="slidenum">
+              <a:rPr lang="en-US" smtClean="0"/>
+              <a:t>4</a:t>
+            </a:fld>
+            <a:endParaRPr lang="en-US"/>
+          </a:p>
+        </p:txBody>
+      </p:sp>
+    </p:spTree>
+    <p:extLst>
+      <p:ext uri="{BB962C8B-B14F-4D97-AF65-F5344CB8AC3E}">
+        <p14:creationId xmlns:p14="http://schemas.microsoft.com/office/powerpoint/2010/main" val="2088780656"/>
+      </p:ext>
+    </p:extLst>
+  </p:cSld>
+  <p:clrMapOvr>
+    <a:masterClrMapping/>
+  </p:clrMapOvr>
+</p:notes>
+</file>
+
+<file path=ppt/notesSlides/notesSlide3.xml><?xml version="1.0" encoding="utf-8"?>
+<p:notes xmlns:a="http://schemas.openxmlformats.org/drawingml/2006/main" xmlns:r="http://schemas.openxmlformats.org/officeDocument/2006/relationships" xmlns:p="http://schemas.openxmlformats.org/presentationml/2006/main">
+  <p:cSld>
+    <p:spTree>
+      <p:nvGrpSpPr>
+        <p:cNvPr id="1" name=""/>
+        <p:cNvGrpSpPr/>
+        <p:nvPr/>
+      </p:nvGrpSpPr>
+      <p:grpSpPr>
+        <a:xfrm>
+          <a:off x="0" y="0"/>
+          <a:ext cx="0" cy="0"/>
+          <a:chOff x="0" y="0"/>
+          <a:chExt cx="0" cy="0"/>
+        </a:xfrm>
+      </p:grpSpPr>
+      <p:sp>
+        <p:nvSpPr>
+          <p:cNvPr id="2" name="Slide Image Placeholder 1"/>
+          <p:cNvSpPr>
+            <a:spLocks noGrp="1" noRot="1" noChangeAspect="1"/>
+          </p:cNvSpPr>
+          <p:nvPr>
+            <p:ph type="sldImg"/>
+          </p:nvPr>
+        </p:nvSpPr>
+        <p:spPr/>
+      </p:sp>
+      <p:sp>
+        <p:nvSpPr>
+          <p:cNvPr id="3" name="Notes Placeholder 2"/>
+          <p:cNvSpPr>
+            <a:spLocks noGrp="1"/>
+          </p:cNvSpPr>
+          <p:nvPr>
+            <p:ph type="body" idx="1"/>
+          </p:nvPr>
+        </p:nvSpPr>
+        <p:spPr/>
+        <p:txBody>
+          <a:bodyPr/>
+          <a:lstStyle/>
+          <a:p>
+            <a:r>
+              <a:rPr lang="en-US" dirty="0"/>
+              <a:t>Heuristic model of route choice: (A) breakdown of space into a hierarchy, differentiating regional, node-based, and road segment-based decision-making; (B) an</a:t>
+            </a:r>
+          </a:p>
+          <a:p>
+            <a:r>
+              <a:rPr lang="en-US" dirty="0"/>
+              <a:t>example route choice process, where different heuristic rule sets are engaged at each level of the hierarchy</a:t>
+            </a:r>
+          </a:p>
+        </p:txBody>
+      </p:sp>
+      <p:sp>
+        <p:nvSpPr>
+          <p:cNvPr id="4" name="Slide Number Placeholder 3"/>
+          <p:cNvSpPr>
+            <a:spLocks noGrp="1"/>
+          </p:cNvSpPr>
+          <p:nvPr>
+            <p:ph type="sldNum" sz="quarter" idx="5"/>
+          </p:nvPr>
+        </p:nvSpPr>
+        <p:spPr/>
+        <p:txBody>
+          <a:bodyPr/>
+          <a:lstStyle/>
+          <a:p>
+            <a:fld id="{43CD079F-D4B9-5549-AC10-BDF83F0E8055}" type="slidenum">
+              <a:rPr lang="en-US" smtClean="0"/>
+              <a:t>8</a:t>
+            </a:fld>
+            <a:endParaRPr lang="en-US"/>
+          </a:p>
+        </p:txBody>
+      </p:sp>
+    </p:spTree>
+    <p:extLst>
+      <p:ext uri="{BB962C8B-B14F-4D97-AF65-F5344CB8AC3E}">
+        <p14:creationId xmlns:p14="http://schemas.microsoft.com/office/powerpoint/2010/main" val="7331331"/>
+      </p:ext>
+    </p:extLst>
+  </p:cSld>
+  <p:clrMapOvr>
+    <a:masterClrMapping/>
+  </p:clrMapOvr>
+</p:notes>
+</file>
+
+<file path=ppt/notesSlides/notesSlide4.xml><?xml version="1.0" encoding="utf-8"?>
+<p:notes xmlns:a="http://schemas.openxmlformats.org/drawingml/2006/main" xmlns:r="http://schemas.openxmlformats.org/officeDocument/2006/relationships" xmlns:p="http://schemas.openxmlformats.org/presentationml/2006/main">
+  <p:cSld>
+    <p:spTree>
+      <p:nvGrpSpPr>
+        <p:cNvPr id="1" name=""/>
+        <p:cNvGrpSpPr/>
+        <p:nvPr/>
+      </p:nvGrpSpPr>
+      <p:grpSpPr>
+        <a:xfrm>
+          <a:off x="0" y="0"/>
+          <a:ext cx="0" cy="0"/>
+          <a:chOff x="0" y="0"/>
+          <a:chExt cx="0" cy="0"/>
+        </a:xfrm>
+      </p:grpSpPr>
+      <p:sp>
+        <p:nvSpPr>
+          <p:cNvPr id="2" name="Slide Image Placeholder 1"/>
+          <p:cNvSpPr>
+            <a:spLocks noGrp="1" noRot="1" noChangeAspect="1"/>
+          </p:cNvSpPr>
+          <p:nvPr>
+            <p:ph type="sldImg"/>
+          </p:nvPr>
+        </p:nvSpPr>
+        <p:spPr/>
+      </p:sp>
+      <p:sp>
+        <p:nvSpPr>
+          <p:cNvPr id="3" name="Notes Placeholder 2"/>
+          <p:cNvSpPr>
+            <a:spLocks noGrp="1"/>
+          </p:cNvSpPr>
+          <p:nvPr>
+            <p:ph type="body" idx="1"/>
+          </p:nvPr>
+        </p:nvSpPr>
+        <p:spPr/>
+        <p:txBody>
+          <a:bodyPr/>
+          <a:lstStyle/>
+          <a:p>
+            <a:endParaRPr lang="en-US" dirty="0"/>
+          </a:p>
+        </p:txBody>
+      </p:sp>
+      <p:sp>
+        <p:nvSpPr>
+          <p:cNvPr id="4" name="Slide Number Placeholder 3"/>
+          <p:cNvSpPr>
+            <a:spLocks noGrp="1"/>
+          </p:cNvSpPr>
+          <p:nvPr>
+            <p:ph type="sldNum" sz="quarter" idx="5"/>
+          </p:nvPr>
+        </p:nvSpPr>
+        <p:spPr/>
+        <p:txBody>
+          <a:bodyPr/>
+          <a:lstStyle/>
+          <a:p>
+            <a:fld id="{43CD079F-D4B9-5549-AC10-BDF83F0E8055}" type="slidenum">
+              <a:rPr lang="en-US" smtClean="0"/>
+              <a:t>11</a:t>
+            </a:fld>
+            <a:endParaRPr lang="en-US"/>
+          </a:p>
+        </p:txBody>
+      </p:sp>
+    </p:spTree>
+    <p:extLst>
+      <p:ext uri="{BB962C8B-B14F-4D97-AF65-F5344CB8AC3E}">
+        <p14:creationId xmlns:p14="http://schemas.microsoft.com/office/powerpoint/2010/main" val="3317087611"/>
+      </p:ext>
+    </p:extLst>
+  </p:cSld>
+  <p:clrMapOvr>
+    <a:masterClrMapping/>
+  </p:clrMapOvr>
+</p:notes>
+</file>
+
 <file path=ppt/slideLayouts/slideLayout1.xml><?xml version="1.0" encoding="utf-8"?>
 <p:sldLayout xmlns:a="http://schemas.openxmlformats.org/drawingml/2006/main" xmlns:r="http://schemas.openxmlformats.org/officeDocument/2006/relationships" xmlns:p="http://schemas.openxmlformats.org/presentationml/2006/main" type="title" preserve="1">
   <p:cSld name="Title Slide">
@@ -735,7 +1056,7 @@
           <a:p>
             <a:fld id="{53326AB7-C146-8643-AC32-1D896C71A7F3}" type="datetimeFigureOut">
               <a:rPr lang="en-US" smtClean="0"/>
-              <a:t>11/6/18</a:t>
+              <a:t>12/16/19</a:t>
             </a:fld>
             <a:endParaRPr lang="en-US"/>
           </a:p>
@@ -933,7 +1254,7 @@
           <a:p>
             <a:fld id="{53326AB7-C146-8643-AC32-1D896C71A7F3}" type="datetimeFigureOut">
               <a:rPr lang="en-US" smtClean="0"/>
-              <a:t>11/6/18</a:t>
+              <a:t>12/16/19</a:t>
             </a:fld>
             <a:endParaRPr lang="en-US"/>
           </a:p>
@@ -1141,7 +1462,7 @@
           <a:p>
             <a:fld id="{53326AB7-C146-8643-AC32-1D896C71A7F3}" type="datetimeFigureOut">
               <a:rPr lang="en-US" smtClean="0"/>
-              <a:t>11/6/18</a:t>
+              <a:t>12/16/19</a:t>
             </a:fld>
             <a:endParaRPr lang="en-US"/>
           </a:p>
@@ -1339,7 +1660,7 @@
           <a:p>
             <a:fld id="{53326AB7-C146-8643-AC32-1D896C71A7F3}" type="datetimeFigureOut">
               <a:rPr lang="en-US" smtClean="0"/>
-              <a:t>11/6/18</a:t>
+              <a:t>12/16/19</a:t>
             </a:fld>
             <a:endParaRPr lang="en-US"/>
           </a:p>
@@ -1614,7 +1935,7 @@
           <a:p>
             <a:fld id="{53326AB7-C146-8643-AC32-1D896C71A7F3}" type="datetimeFigureOut">
               <a:rPr lang="en-US" smtClean="0"/>
-              <a:t>11/6/18</a:t>
+              <a:t>12/16/19</a:t>
             </a:fld>
             <a:endParaRPr lang="en-US"/>
           </a:p>
@@ -1879,7 +2200,7 @@
           <a:p>
             <a:fld id="{53326AB7-C146-8643-AC32-1D896C71A7F3}" type="datetimeFigureOut">
               <a:rPr lang="en-US" smtClean="0"/>
-              <a:t>11/6/18</a:t>
+              <a:t>12/16/19</a:t>
             </a:fld>
             <a:endParaRPr lang="en-US"/>
           </a:p>
@@ -2291,7 +2612,7 @@
           <a:p>
             <a:fld id="{53326AB7-C146-8643-AC32-1D896C71A7F3}" type="datetimeFigureOut">
               <a:rPr lang="en-US" smtClean="0"/>
-              <a:t>11/6/18</a:t>
+              <a:t>12/16/19</a:t>
             </a:fld>
             <a:endParaRPr lang="en-US"/>
           </a:p>
@@ -2432,7 +2753,7 @@
           <a:p>
             <a:fld id="{53326AB7-C146-8643-AC32-1D896C71A7F3}" type="datetimeFigureOut">
               <a:rPr lang="en-US" smtClean="0"/>
-              <a:t>11/6/18</a:t>
+              <a:t>12/16/19</a:t>
             </a:fld>
             <a:endParaRPr lang="en-US"/>
           </a:p>
@@ -2545,7 +2866,7 @@
           <a:p>
             <a:fld id="{53326AB7-C146-8643-AC32-1D896C71A7F3}" type="datetimeFigureOut">
               <a:rPr lang="en-US" smtClean="0"/>
-              <a:t>11/6/18</a:t>
+              <a:t>12/16/19</a:t>
             </a:fld>
             <a:endParaRPr lang="en-US"/>
           </a:p>
@@ -2856,7 +3177,7 @@
           <a:p>
             <a:fld id="{53326AB7-C146-8643-AC32-1D896C71A7F3}" type="datetimeFigureOut">
               <a:rPr lang="en-US" smtClean="0"/>
-              <a:t>11/6/18</a:t>
+              <a:t>12/16/19</a:t>
             </a:fld>
             <a:endParaRPr lang="en-US"/>
           </a:p>
@@ -3144,7 +3465,7 @@
           <a:p>
             <a:fld id="{53326AB7-C146-8643-AC32-1D896C71A7F3}" type="datetimeFigureOut">
               <a:rPr lang="en-US" smtClean="0"/>
-              <a:t>11/6/18</a:t>
+              <a:t>12/16/19</a:t>
             </a:fld>
             <a:endParaRPr lang="en-US"/>
           </a:p>
@@ -3385,7 +3706,7 @@
           <a:p>
             <a:fld id="{53326AB7-C146-8643-AC32-1D896C71A7F3}" type="datetimeFigureOut">
               <a:rPr lang="en-US" smtClean="0"/>
-              <a:t>11/6/18</a:t>
+              <a:t>12/16/19</a:t>
             </a:fld>
             <a:endParaRPr lang="en-US"/>
           </a:p>
@@ -3998,6 +4319,272 @@
 </p:sld>
 </file>
 
+<file path=ppt/slides/slide10.xml><?xml version="1.0" encoding="utf-8"?>
+<p:sld xmlns:a="http://schemas.openxmlformats.org/drawingml/2006/main" xmlns:r="http://schemas.openxmlformats.org/officeDocument/2006/relationships" xmlns:p="http://schemas.openxmlformats.org/presentationml/2006/main">
+  <p:cSld>
+    <p:spTree>
+      <p:nvGrpSpPr>
+        <p:cNvPr id="1" name=""/>
+        <p:cNvGrpSpPr/>
+        <p:nvPr/>
+      </p:nvGrpSpPr>
+      <p:grpSpPr>
+        <a:xfrm>
+          <a:off x="0" y="0"/>
+          <a:ext cx="0" cy="0"/>
+          <a:chOff x="0" y="0"/>
+          <a:chExt cx="0" cy="0"/>
+        </a:xfrm>
+      </p:grpSpPr>
+      <p:sp>
+        <p:nvSpPr>
+          <p:cNvPr id="2" name="Title 1">
+            <a:extLst>
+              <a:ext uri="{FF2B5EF4-FFF2-40B4-BE49-F238E27FC236}">
+                <a16:creationId xmlns:a16="http://schemas.microsoft.com/office/drawing/2014/main" id="{42DBA1B7-101A-944D-97B2-E8228E2EAD08}"/>
+              </a:ext>
+            </a:extLst>
+          </p:cNvPr>
+          <p:cNvSpPr>
+            <a:spLocks noGrp="1"/>
+          </p:cNvSpPr>
+          <p:nvPr>
+            <p:ph type="title"/>
+          </p:nvPr>
+        </p:nvSpPr>
+        <p:spPr/>
+        <p:txBody>
+          <a:bodyPr>
+            <a:normAutofit/>
+          </a:bodyPr>
+          <a:lstStyle/>
+          <a:p>
+            <a:r>
+              <a:rPr lang="en-US" dirty="0"/>
+              <a:t>Basic spatial environment created within NetLogo that the consumer agents occupy</a:t>
+            </a:r>
+          </a:p>
+        </p:txBody>
+      </p:sp>
+      <p:pic>
+        <p:nvPicPr>
+          <p:cNvPr id="5" name="Content Placeholder 4" descr="A picture containing screenshot&#10;&#10;Description automatically generated">
+            <a:extLst>
+              <a:ext uri="{FF2B5EF4-FFF2-40B4-BE49-F238E27FC236}">
+                <a16:creationId xmlns:a16="http://schemas.microsoft.com/office/drawing/2014/main" id="{5226CEB4-AA66-534F-8715-2B932006D6FA}"/>
+              </a:ext>
+            </a:extLst>
+          </p:cNvPr>
+          <p:cNvPicPr>
+            <a:picLocks noGrp="1" noChangeAspect="1"/>
+          </p:cNvPicPr>
+          <p:nvPr>
+            <p:ph idx="1"/>
+          </p:nvPr>
+        </p:nvPicPr>
+        <p:blipFill>
+          <a:blip r:embed="rId2"/>
+          <a:stretch>
+            <a:fillRect/>
+          </a:stretch>
+        </p:blipFill>
+        <p:spPr>
+          <a:xfrm>
+            <a:off x="3613150" y="1951020"/>
+            <a:ext cx="4305300" cy="4541855"/>
+          </a:xfrm>
+        </p:spPr>
+      </p:pic>
+      <p:sp>
+        <p:nvSpPr>
+          <p:cNvPr id="6" name="TextBox 5">
+            <a:extLst>
+              <a:ext uri="{FF2B5EF4-FFF2-40B4-BE49-F238E27FC236}">
+                <a16:creationId xmlns:a16="http://schemas.microsoft.com/office/drawing/2014/main" id="{8713B193-4EDA-2243-A5E9-52681C7838E4}"/>
+              </a:ext>
+            </a:extLst>
+          </p:cNvPr>
+          <p:cNvSpPr txBox="1"/>
+          <p:nvPr/>
+        </p:nvSpPr>
+        <p:spPr>
+          <a:xfrm>
+            <a:off x="8413750" y="6192793"/>
+            <a:ext cx="4483100" cy="600164"/>
+          </a:xfrm>
+          <a:prstGeom prst="rect">
+            <a:avLst/>
+          </a:prstGeom>
+          <a:noFill/>
+        </p:spPr>
+        <p:txBody>
+          <a:bodyPr wrap="square" rtlCol="0">
+            <a:spAutoFit/>
+          </a:bodyPr>
+          <a:lstStyle/>
+          <a:p>
+            <a:r>
+              <a:rPr lang="en-US" sz="1100" dirty="0"/>
+              <a:t>Model Available at: </a:t>
+            </a:r>
+            <a:r>
+              <a:rPr lang="en-US" sz="1100" dirty="0">
+                <a:hlinkClick r:id="rId3"/>
+              </a:rPr>
+              <a:t>https://github.com/abmgis/abmgis/tree/master/Chapter07-ModellingHumanBehaviour/Models/Store_choice_model</a:t>
+            </a:r>
+            <a:r>
+              <a:rPr lang="en-US" sz="1100" dirty="0"/>
+              <a:t> </a:t>
+            </a:r>
+          </a:p>
+        </p:txBody>
+      </p:sp>
+    </p:spTree>
+    <p:extLst>
+      <p:ext uri="{BB962C8B-B14F-4D97-AF65-F5344CB8AC3E}">
+        <p14:creationId xmlns:p14="http://schemas.microsoft.com/office/powerpoint/2010/main" val="1096027006"/>
+      </p:ext>
+    </p:extLst>
+  </p:cSld>
+  <p:clrMapOvr>
+    <a:masterClrMapping/>
+  </p:clrMapOvr>
+</p:sld>
+</file>
+
+<file path=ppt/slides/slide11.xml><?xml version="1.0" encoding="utf-8"?>
+<p:sld xmlns:a="http://schemas.openxmlformats.org/drawingml/2006/main" xmlns:r="http://schemas.openxmlformats.org/officeDocument/2006/relationships" xmlns:p="http://schemas.openxmlformats.org/presentationml/2006/main">
+  <p:cSld>
+    <p:spTree>
+      <p:nvGrpSpPr>
+        <p:cNvPr id="1" name=""/>
+        <p:cNvGrpSpPr/>
+        <p:nvPr/>
+      </p:nvGrpSpPr>
+      <p:grpSpPr>
+        <a:xfrm>
+          <a:off x="0" y="0"/>
+          <a:ext cx="0" cy="0"/>
+          <a:chOff x="0" y="0"/>
+          <a:chExt cx="0" cy="0"/>
+        </a:xfrm>
+      </p:grpSpPr>
+      <p:sp>
+        <p:nvSpPr>
+          <p:cNvPr id="2" name="Title 1">
+            <a:extLst>
+              <a:ext uri="{FF2B5EF4-FFF2-40B4-BE49-F238E27FC236}">
+                <a16:creationId xmlns:a16="http://schemas.microsoft.com/office/drawing/2014/main" id="{E16E6DD0-86E4-FA49-89FF-A559DD8CB823}"/>
+              </a:ext>
+            </a:extLst>
+          </p:cNvPr>
+          <p:cNvSpPr>
+            <a:spLocks noGrp="1"/>
+          </p:cNvSpPr>
+          <p:nvPr>
+            <p:ph type="title"/>
+          </p:nvPr>
+        </p:nvSpPr>
+        <p:spPr/>
+        <p:txBody>
+          <a:bodyPr>
+            <a:normAutofit fontScale="90000"/>
+          </a:bodyPr>
+          <a:lstStyle/>
+          <a:p>
+            <a:r>
+              <a:rPr lang="en-US" dirty="0"/>
+              <a:t>A high-level representation of the resident agent </a:t>
+            </a:r>
+            <a:r>
+              <a:rPr lang="en-US" dirty="0" err="1"/>
+              <a:t>behaviour</a:t>
+            </a:r>
+            <a:r>
+              <a:rPr lang="en-US" dirty="0"/>
+              <a:t> incorporated into the PECS framework</a:t>
+            </a:r>
+          </a:p>
+        </p:txBody>
+      </p:sp>
+      <p:pic>
+        <p:nvPicPr>
+          <p:cNvPr id="5" name="Content Placeholder 4" descr="A screenshot of a cell phone&#10;&#10;Description automatically generated">
+            <a:extLst>
+              <a:ext uri="{FF2B5EF4-FFF2-40B4-BE49-F238E27FC236}">
+                <a16:creationId xmlns:a16="http://schemas.microsoft.com/office/drawing/2014/main" id="{C2CE3198-918E-1A46-B06C-648BCC5DF175}"/>
+              </a:ext>
+            </a:extLst>
+          </p:cNvPr>
+          <p:cNvPicPr>
+            <a:picLocks noGrp="1" noChangeAspect="1"/>
+          </p:cNvPicPr>
+          <p:nvPr>
+            <p:ph idx="1"/>
+          </p:nvPr>
+        </p:nvPicPr>
+        <p:blipFill>
+          <a:blip r:embed="rId3"/>
+          <a:stretch>
+            <a:fillRect/>
+          </a:stretch>
+        </p:blipFill>
+        <p:spPr>
+          <a:xfrm>
+            <a:off x="3374630" y="1825625"/>
+            <a:ext cx="5442739" cy="4351338"/>
+          </a:xfrm>
+        </p:spPr>
+      </p:pic>
+      <p:sp>
+        <p:nvSpPr>
+          <p:cNvPr id="6" name="TextBox 5">
+            <a:extLst>
+              <a:ext uri="{FF2B5EF4-FFF2-40B4-BE49-F238E27FC236}">
+                <a16:creationId xmlns:a16="http://schemas.microsoft.com/office/drawing/2014/main" id="{38C121D0-6E08-8B48-B51A-14ED2387AEA2}"/>
+              </a:ext>
+            </a:extLst>
+          </p:cNvPr>
+          <p:cNvSpPr txBox="1"/>
+          <p:nvPr/>
+        </p:nvSpPr>
+        <p:spPr>
+          <a:xfrm>
+            <a:off x="2406649" y="6380163"/>
+            <a:ext cx="7378700" cy="369332"/>
+          </a:xfrm>
+          <a:prstGeom prst="rect">
+            <a:avLst/>
+          </a:prstGeom>
+          <a:noFill/>
+        </p:spPr>
+        <p:txBody>
+          <a:bodyPr wrap="square" rtlCol="0">
+            <a:spAutoFit/>
+          </a:bodyPr>
+          <a:lstStyle/>
+          <a:p>
+            <a:r>
+              <a:rPr lang="en-US" dirty="0"/>
+              <a:t>After Pires and Crooks, 2017, which was adapted in turn from Schmidt, 2000)</a:t>
+            </a:r>
+          </a:p>
+        </p:txBody>
+      </p:sp>
+    </p:spTree>
+    <p:extLst>
+      <p:ext uri="{BB962C8B-B14F-4D97-AF65-F5344CB8AC3E}">
+        <p14:creationId xmlns:p14="http://schemas.microsoft.com/office/powerpoint/2010/main" val="267175671"/>
+      </p:ext>
+    </p:extLst>
+  </p:cSld>
+  <p:clrMapOvr>
+    <a:masterClrMapping/>
+  </p:clrMapOvr>
+</p:sld>
+</file>
+
 <file path=ppt/slides/slide2.xml><?xml version="1.0" encoding="utf-8"?>
 <p:sld xmlns:a="http://schemas.openxmlformats.org/drawingml/2006/main" xmlns:r="http://schemas.openxmlformats.org/officeDocument/2006/relationships" xmlns:p="http://schemas.openxmlformats.org/presentationml/2006/main">
   <p:cSld>
@@ -4155,6 +4742,656 @@
     <p:extLst>
       <p:ext uri="{BB962C8B-B14F-4D97-AF65-F5344CB8AC3E}">
         <p14:creationId xmlns:p14="http://schemas.microsoft.com/office/powerpoint/2010/main" val="195590378"/>
+      </p:ext>
+    </p:extLst>
+  </p:cSld>
+  <p:clrMapOvr>
+    <a:masterClrMapping/>
+  </p:clrMapOvr>
+</p:sld>
+</file>
+
+<file path=ppt/slides/slide4.xml><?xml version="1.0" encoding="utf-8"?>
+<p:sld xmlns:a="http://schemas.openxmlformats.org/drawingml/2006/main" xmlns:r="http://schemas.openxmlformats.org/officeDocument/2006/relationships" xmlns:p="http://schemas.openxmlformats.org/presentationml/2006/main">
+  <p:cSld>
+    <p:spTree>
+      <p:nvGrpSpPr>
+        <p:cNvPr id="1" name=""/>
+        <p:cNvGrpSpPr/>
+        <p:nvPr/>
+      </p:nvGrpSpPr>
+      <p:grpSpPr>
+        <a:xfrm>
+          <a:off x="0" y="0"/>
+          <a:ext cx="0" cy="0"/>
+          <a:chOff x="0" y="0"/>
+          <a:chExt cx="0" cy="0"/>
+        </a:xfrm>
+      </p:grpSpPr>
+      <p:pic>
+        <p:nvPicPr>
+          <p:cNvPr id="7" name="Picture 6" descr="A screenshot of a social media post&#10;&#10;Description automatically generated">
+            <a:extLst>
+              <a:ext uri="{FF2B5EF4-FFF2-40B4-BE49-F238E27FC236}">
+                <a16:creationId xmlns:a16="http://schemas.microsoft.com/office/drawing/2014/main" id="{100FDCB5-B244-EB46-81EF-C18209F3DE25}"/>
+              </a:ext>
+            </a:extLst>
+          </p:cNvPr>
+          <p:cNvPicPr>
+            <a:picLocks noChangeAspect="1"/>
+          </p:cNvPicPr>
+          <p:nvPr/>
+        </p:nvPicPr>
+        <p:blipFill rotWithShape="1">
+          <a:blip r:embed="rId3"/>
+          <a:srcRect t="52716"/>
+          <a:stretch/>
+        </p:blipFill>
+        <p:spPr>
+          <a:xfrm>
+            <a:off x="5839516" y="2710187"/>
+            <a:ext cx="6352484" cy="3782688"/>
+          </a:xfrm>
+          <a:prstGeom prst="rect">
+            <a:avLst/>
+          </a:prstGeom>
+        </p:spPr>
+      </p:pic>
+      <p:sp>
+        <p:nvSpPr>
+          <p:cNvPr id="2" name="Title 1">
+            <a:extLst>
+              <a:ext uri="{FF2B5EF4-FFF2-40B4-BE49-F238E27FC236}">
+                <a16:creationId xmlns:a16="http://schemas.microsoft.com/office/drawing/2014/main" id="{D1CB3D15-52A8-3146-AF68-497FCFEE8298}"/>
+              </a:ext>
+            </a:extLst>
+          </p:cNvPr>
+          <p:cNvSpPr>
+            <a:spLocks noGrp="1"/>
+          </p:cNvSpPr>
+          <p:nvPr>
+            <p:ph type="title"/>
+          </p:nvPr>
+        </p:nvSpPr>
+        <p:spPr>
+          <a:xfrm>
+            <a:off x="691096" y="1247671"/>
+            <a:ext cx="10972800" cy="1325563"/>
+          </a:xfrm>
+        </p:spPr>
+        <p:txBody>
+          <a:bodyPr>
+            <a:normAutofit fontScale="90000"/>
+          </a:bodyPr>
+          <a:lstStyle/>
+          <a:p>
+            <a:r>
+              <a:rPr lang="en-US" dirty="0" err="1"/>
+              <a:t>Behavioural</a:t>
+            </a:r>
+            <a:r>
+              <a:rPr lang="en-US" dirty="0"/>
+              <a:t> complexity plotted against environmental complexity for selected applications</a:t>
+            </a:r>
+            <a:br>
+              <a:rPr lang="en-US" dirty="0"/>
+            </a:br>
+            <a:br>
+              <a:rPr lang="en-US" dirty="0"/>
+            </a:br>
+            <a:endParaRPr lang="en-US" dirty="0"/>
+          </a:p>
+        </p:txBody>
+      </p:sp>
+      <p:pic>
+        <p:nvPicPr>
+          <p:cNvPr id="5" name="Content Placeholder 4" descr="A screenshot of a social media post&#10;&#10;Description automatically generated">
+            <a:extLst>
+              <a:ext uri="{FF2B5EF4-FFF2-40B4-BE49-F238E27FC236}">
+                <a16:creationId xmlns:a16="http://schemas.microsoft.com/office/drawing/2014/main" id="{21D4F49C-BDA5-C44A-A363-2B10A0AE338E}"/>
+              </a:ext>
+            </a:extLst>
+          </p:cNvPr>
+          <p:cNvPicPr>
+            <a:picLocks noGrp="1" noChangeAspect="1"/>
+          </p:cNvPicPr>
+          <p:nvPr>
+            <p:ph idx="1"/>
+          </p:nvPr>
+        </p:nvPicPr>
+        <p:blipFill rotWithShape="1">
+          <a:blip r:embed="rId3"/>
+          <a:srcRect b="46613"/>
+          <a:stretch/>
+        </p:blipFill>
+        <p:spPr>
+          <a:xfrm>
+            <a:off x="177486" y="2573234"/>
+            <a:ext cx="6000010" cy="4033941"/>
+          </a:xfrm>
+        </p:spPr>
+      </p:pic>
+    </p:spTree>
+    <p:extLst>
+      <p:ext uri="{BB962C8B-B14F-4D97-AF65-F5344CB8AC3E}">
+        <p14:creationId xmlns:p14="http://schemas.microsoft.com/office/powerpoint/2010/main" val="3776048230"/>
+      </p:ext>
+    </p:extLst>
+  </p:cSld>
+  <p:clrMapOvr>
+    <a:masterClrMapping/>
+  </p:clrMapOvr>
+</p:sld>
+</file>
+
+<file path=ppt/slides/slide5.xml><?xml version="1.0" encoding="utf-8"?>
+<p:sld xmlns:a="http://schemas.openxmlformats.org/drawingml/2006/main" xmlns:r="http://schemas.openxmlformats.org/officeDocument/2006/relationships" xmlns:p="http://schemas.openxmlformats.org/presentationml/2006/main">
+  <p:cSld>
+    <p:spTree>
+      <p:nvGrpSpPr>
+        <p:cNvPr id="1" name=""/>
+        <p:cNvGrpSpPr/>
+        <p:nvPr/>
+      </p:nvGrpSpPr>
+      <p:grpSpPr>
+        <a:xfrm>
+          <a:off x="0" y="0"/>
+          <a:ext cx="0" cy="0"/>
+          <a:chOff x="0" y="0"/>
+          <a:chExt cx="0" cy="0"/>
+        </a:xfrm>
+      </p:grpSpPr>
+      <p:sp>
+        <p:nvSpPr>
+          <p:cNvPr id="2" name="Title 1">
+            <a:extLst>
+              <a:ext uri="{FF2B5EF4-FFF2-40B4-BE49-F238E27FC236}">
+                <a16:creationId xmlns:a16="http://schemas.microsoft.com/office/drawing/2014/main" id="{91B7EE9D-6B5B-2D47-84E0-12965BABDB12}"/>
+              </a:ext>
+            </a:extLst>
+          </p:cNvPr>
+          <p:cNvSpPr>
+            <a:spLocks noGrp="1"/>
+          </p:cNvSpPr>
+          <p:nvPr>
+            <p:ph type="title"/>
+          </p:nvPr>
+        </p:nvSpPr>
+        <p:spPr/>
+        <p:txBody>
+          <a:bodyPr/>
+          <a:lstStyle/>
+          <a:p>
+            <a:r>
+              <a:rPr lang="en-US" dirty="0"/>
+              <a:t>The five main dimensions for distinguishing agent architectures</a:t>
+            </a:r>
+          </a:p>
+        </p:txBody>
+      </p:sp>
+      <p:pic>
+        <p:nvPicPr>
+          <p:cNvPr id="5" name="Content Placeholder 4" descr="A screenshot of a cell phone&#10;&#10;Description automatically generated">
+            <a:extLst>
+              <a:ext uri="{FF2B5EF4-FFF2-40B4-BE49-F238E27FC236}">
+                <a16:creationId xmlns:a16="http://schemas.microsoft.com/office/drawing/2014/main" id="{5068DB22-ECF0-F149-9196-2225CEADCA19}"/>
+              </a:ext>
+            </a:extLst>
+          </p:cNvPr>
+          <p:cNvPicPr>
+            <a:picLocks noGrp="1" noChangeAspect="1"/>
+          </p:cNvPicPr>
+          <p:nvPr>
+            <p:ph idx="1"/>
+          </p:nvPr>
+        </p:nvPicPr>
+        <p:blipFill>
+          <a:blip r:embed="rId2"/>
+          <a:stretch>
+            <a:fillRect/>
+          </a:stretch>
+        </p:blipFill>
+        <p:spPr>
+          <a:xfrm>
+            <a:off x="1219200" y="1690688"/>
+            <a:ext cx="9753600" cy="4859001"/>
+          </a:xfrm>
+        </p:spPr>
+      </p:pic>
+    </p:spTree>
+    <p:extLst>
+      <p:ext uri="{BB962C8B-B14F-4D97-AF65-F5344CB8AC3E}">
+        <p14:creationId xmlns:p14="http://schemas.microsoft.com/office/powerpoint/2010/main" val="4253539851"/>
+      </p:ext>
+    </p:extLst>
+  </p:cSld>
+  <p:clrMapOvr>
+    <a:masterClrMapping/>
+  </p:clrMapOvr>
+</p:sld>
+</file>
+
+<file path=ppt/slides/slide6.xml><?xml version="1.0" encoding="utf-8"?>
+<p:sld xmlns:a="http://schemas.openxmlformats.org/drawingml/2006/main" xmlns:r="http://schemas.openxmlformats.org/officeDocument/2006/relationships" xmlns:p="http://schemas.openxmlformats.org/presentationml/2006/main">
+  <p:cSld>
+    <p:spTree>
+      <p:nvGrpSpPr>
+        <p:cNvPr id="1" name=""/>
+        <p:cNvGrpSpPr/>
+        <p:nvPr/>
+      </p:nvGrpSpPr>
+      <p:grpSpPr>
+        <a:xfrm>
+          <a:off x="0" y="0"/>
+          <a:ext cx="0" cy="0"/>
+          <a:chOff x="0" y="0"/>
+          <a:chExt cx="0" cy="0"/>
+        </a:xfrm>
+      </p:grpSpPr>
+      <p:pic>
+        <p:nvPicPr>
+          <p:cNvPr id="7" name="Picture 6" descr="A close up of text on a white background&#10;&#10;Description automatically generated">
+            <a:extLst>
+              <a:ext uri="{FF2B5EF4-FFF2-40B4-BE49-F238E27FC236}">
+                <a16:creationId xmlns:a16="http://schemas.microsoft.com/office/drawing/2014/main" id="{4B3DB3A9-948A-6841-A82E-C8886A68FBF4}"/>
+              </a:ext>
+            </a:extLst>
+          </p:cNvPr>
+          <p:cNvPicPr>
+            <a:picLocks noChangeAspect="1"/>
+          </p:cNvPicPr>
+          <p:nvPr/>
+        </p:nvPicPr>
+        <p:blipFill rotWithShape="1">
+          <a:blip r:embed="rId2"/>
+          <a:srcRect l="11911"/>
+          <a:stretch/>
+        </p:blipFill>
+        <p:spPr>
+          <a:xfrm rot="5400000">
+            <a:off x="1631134" y="1830295"/>
+            <a:ext cx="3459786" cy="6595625"/>
+          </a:xfrm>
+          <a:prstGeom prst="rect">
+            <a:avLst/>
+          </a:prstGeom>
+        </p:spPr>
+      </p:pic>
+      <p:sp>
+        <p:nvSpPr>
+          <p:cNvPr id="2" name="Title 1">
+            <a:extLst>
+              <a:ext uri="{FF2B5EF4-FFF2-40B4-BE49-F238E27FC236}">
+                <a16:creationId xmlns:a16="http://schemas.microsoft.com/office/drawing/2014/main" id="{DD7EDF51-515A-594D-A2D6-12E8541B03B3}"/>
+              </a:ext>
+            </a:extLst>
+          </p:cNvPr>
+          <p:cNvSpPr>
+            <a:spLocks noGrp="1"/>
+          </p:cNvSpPr>
+          <p:nvPr>
+            <p:ph type="title"/>
+          </p:nvPr>
+        </p:nvSpPr>
+        <p:spPr>
+          <a:xfrm>
+            <a:off x="7277100" y="2006870"/>
+            <a:ext cx="4914900" cy="1325563"/>
+          </a:xfrm>
+        </p:spPr>
+        <p:txBody>
+          <a:bodyPr>
+            <a:normAutofit fontScale="90000"/>
+          </a:bodyPr>
+          <a:lstStyle/>
+          <a:p>
+            <a:pPr algn="ctr"/>
+            <a:r>
+              <a:rPr lang="en-US" dirty="0"/>
+              <a:t>Overview of the key assumptions and application areas of popular theories used in representing </a:t>
+            </a:r>
+            <a:r>
+              <a:rPr lang="en-US" dirty="0" err="1"/>
+              <a:t>behaviour</a:t>
+            </a:r>
+            <a:endParaRPr lang="en-US" dirty="0"/>
+          </a:p>
+        </p:txBody>
+      </p:sp>
+      <p:pic>
+        <p:nvPicPr>
+          <p:cNvPr id="5" name="Content Placeholder 4" descr="A screenshot of a cell phone&#10;&#10;Description automatically generated">
+            <a:extLst>
+              <a:ext uri="{FF2B5EF4-FFF2-40B4-BE49-F238E27FC236}">
+                <a16:creationId xmlns:a16="http://schemas.microsoft.com/office/drawing/2014/main" id="{4C8D32DF-072D-E943-9CAC-BF2C13E3AFD1}"/>
+              </a:ext>
+            </a:extLst>
+          </p:cNvPr>
+          <p:cNvPicPr>
+            <a:picLocks noGrp="1" noChangeAspect="1"/>
+          </p:cNvPicPr>
+          <p:nvPr>
+            <p:ph idx="1"/>
+          </p:nvPr>
+        </p:nvPicPr>
+        <p:blipFill rotWithShape="1">
+          <a:blip r:embed="rId3"/>
+          <a:srcRect l="1466" r="4270"/>
+          <a:stretch/>
+        </p:blipFill>
+        <p:spPr>
+          <a:xfrm rot="5400000">
+            <a:off x="1850561" y="-1475846"/>
+            <a:ext cx="3141865" cy="6474693"/>
+          </a:xfrm>
+        </p:spPr>
+      </p:pic>
+    </p:spTree>
+    <p:extLst>
+      <p:ext uri="{BB962C8B-B14F-4D97-AF65-F5344CB8AC3E}">
+        <p14:creationId xmlns:p14="http://schemas.microsoft.com/office/powerpoint/2010/main" val="1212147741"/>
+      </p:ext>
+    </p:extLst>
+  </p:cSld>
+  <p:clrMapOvr>
+    <a:masterClrMapping/>
+  </p:clrMapOvr>
+</p:sld>
+</file>
+
+<file path=ppt/slides/slide7.xml><?xml version="1.0" encoding="utf-8"?>
+<p:sld xmlns:a="http://schemas.openxmlformats.org/drawingml/2006/main" xmlns:r="http://schemas.openxmlformats.org/officeDocument/2006/relationships" xmlns:p="http://schemas.openxmlformats.org/presentationml/2006/main">
+  <p:cSld>
+    <p:spTree>
+      <p:nvGrpSpPr>
+        <p:cNvPr id="1" name=""/>
+        <p:cNvGrpSpPr/>
+        <p:nvPr/>
+      </p:nvGrpSpPr>
+      <p:grpSpPr>
+        <a:xfrm>
+          <a:off x="0" y="0"/>
+          <a:ext cx="0" cy="0"/>
+          <a:chOff x="0" y="0"/>
+          <a:chExt cx="0" cy="0"/>
+        </a:xfrm>
+      </p:grpSpPr>
+      <p:sp>
+        <p:nvSpPr>
+          <p:cNvPr id="2" name="Title 1">
+            <a:extLst>
+              <a:ext uri="{FF2B5EF4-FFF2-40B4-BE49-F238E27FC236}">
+                <a16:creationId xmlns:a16="http://schemas.microsoft.com/office/drawing/2014/main" id="{0ECDD82B-890D-1148-9DBE-0C9B2A2FA47C}"/>
+              </a:ext>
+            </a:extLst>
+          </p:cNvPr>
+          <p:cNvSpPr>
+            <a:spLocks noGrp="1"/>
+          </p:cNvSpPr>
+          <p:nvPr>
+            <p:ph type="title"/>
+          </p:nvPr>
+        </p:nvSpPr>
+        <p:spPr/>
+        <p:txBody>
+          <a:bodyPr/>
+          <a:lstStyle/>
+          <a:p>
+            <a:r>
+              <a:rPr lang="en-US" dirty="0"/>
+              <a:t>Resulting patterns of segregation from different threshold levels</a:t>
+            </a:r>
+          </a:p>
+        </p:txBody>
+      </p:sp>
+      <p:pic>
+        <p:nvPicPr>
+          <p:cNvPr id="5" name="Content Placeholder 4" descr="A close up of a screen&#10;&#10;Description automatically generated">
+            <a:extLst>
+              <a:ext uri="{FF2B5EF4-FFF2-40B4-BE49-F238E27FC236}">
+                <a16:creationId xmlns:a16="http://schemas.microsoft.com/office/drawing/2014/main" id="{8008FFE9-CA9E-C143-9E59-82F5D3D58838}"/>
+              </a:ext>
+            </a:extLst>
+          </p:cNvPr>
+          <p:cNvPicPr>
+            <a:picLocks noGrp="1" noChangeAspect="1"/>
+          </p:cNvPicPr>
+          <p:nvPr>
+            <p:ph idx="1"/>
+          </p:nvPr>
+        </p:nvPicPr>
+        <p:blipFill>
+          <a:blip r:embed="rId2"/>
+          <a:stretch>
+            <a:fillRect/>
+          </a:stretch>
+        </p:blipFill>
+        <p:spPr>
+          <a:xfrm>
+            <a:off x="654673" y="2210594"/>
+            <a:ext cx="11238877" cy="3098006"/>
+          </a:xfrm>
+        </p:spPr>
+      </p:pic>
+    </p:spTree>
+    <p:extLst>
+      <p:ext uri="{BB962C8B-B14F-4D97-AF65-F5344CB8AC3E}">
+        <p14:creationId xmlns:p14="http://schemas.microsoft.com/office/powerpoint/2010/main" val="433326218"/>
+      </p:ext>
+    </p:extLst>
+  </p:cSld>
+  <p:clrMapOvr>
+    <a:masterClrMapping/>
+  </p:clrMapOvr>
+</p:sld>
+</file>
+
+<file path=ppt/slides/slide8.xml><?xml version="1.0" encoding="utf-8"?>
+<p:sld xmlns:a="http://schemas.openxmlformats.org/drawingml/2006/main" xmlns:r="http://schemas.openxmlformats.org/officeDocument/2006/relationships" xmlns:p="http://schemas.openxmlformats.org/presentationml/2006/main">
+  <p:cSld>
+    <p:spTree>
+      <p:nvGrpSpPr>
+        <p:cNvPr id="1" name=""/>
+        <p:cNvGrpSpPr/>
+        <p:nvPr/>
+      </p:nvGrpSpPr>
+      <p:grpSpPr>
+        <a:xfrm>
+          <a:off x="0" y="0"/>
+          <a:ext cx="0" cy="0"/>
+          <a:chOff x="0" y="0"/>
+          <a:chExt cx="0" cy="0"/>
+        </a:xfrm>
+      </p:grpSpPr>
+      <p:sp>
+        <p:nvSpPr>
+          <p:cNvPr id="2" name="Title 1">
+            <a:extLst>
+              <a:ext uri="{FF2B5EF4-FFF2-40B4-BE49-F238E27FC236}">
+                <a16:creationId xmlns:a16="http://schemas.microsoft.com/office/drawing/2014/main" id="{FE6BF863-75D9-3B44-8838-9F65E52829FA}"/>
+              </a:ext>
+            </a:extLst>
+          </p:cNvPr>
+          <p:cNvSpPr>
+            <a:spLocks noGrp="1"/>
+          </p:cNvSpPr>
+          <p:nvPr>
+            <p:ph type="title"/>
+          </p:nvPr>
+        </p:nvSpPr>
+        <p:spPr/>
+        <p:txBody>
+          <a:bodyPr/>
+          <a:lstStyle/>
+          <a:p>
+            <a:r>
+              <a:rPr lang="en-US" dirty="0"/>
+              <a:t>Heuristic model of route choice</a:t>
+            </a:r>
+          </a:p>
+        </p:txBody>
+      </p:sp>
+      <p:pic>
+        <p:nvPicPr>
+          <p:cNvPr id="5" name="Content Placeholder 4" descr="A close up of a map&#10;&#10;Description automatically generated">
+            <a:extLst>
+              <a:ext uri="{FF2B5EF4-FFF2-40B4-BE49-F238E27FC236}">
+                <a16:creationId xmlns:a16="http://schemas.microsoft.com/office/drawing/2014/main" id="{77B9F937-AA99-CE42-A5E2-4230FA563310}"/>
+              </a:ext>
+            </a:extLst>
+          </p:cNvPr>
+          <p:cNvPicPr>
+            <a:picLocks noGrp="1" noChangeAspect="1"/>
+          </p:cNvPicPr>
+          <p:nvPr>
+            <p:ph idx="1"/>
+          </p:nvPr>
+        </p:nvPicPr>
+        <p:blipFill>
+          <a:blip r:embed="rId3"/>
+          <a:stretch>
+            <a:fillRect/>
+          </a:stretch>
+        </p:blipFill>
+        <p:spPr>
+          <a:xfrm>
+            <a:off x="2059900" y="1406525"/>
+            <a:ext cx="8072197" cy="4351338"/>
+          </a:xfrm>
+        </p:spPr>
+      </p:pic>
+      <p:sp>
+        <p:nvSpPr>
+          <p:cNvPr id="6" name="TextBox 5">
+            <a:extLst>
+              <a:ext uri="{FF2B5EF4-FFF2-40B4-BE49-F238E27FC236}">
+                <a16:creationId xmlns:a16="http://schemas.microsoft.com/office/drawing/2014/main" id="{971C4D85-1966-4C49-A1B3-78AF2A224521}"/>
+              </a:ext>
+            </a:extLst>
+          </p:cNvPr>
+          <p:cNvSpPr txBox="1"/>
+          <p:nvPr/>
+        </p:nvSpPr>
+        <p:spPr>
+          <a:xfrm>
+            <a:off x="279401" y="6119336"/>
+            <a:ext cx="11912600" cy="1200329"/>
+          </a:xfrm>
+          <a:prstGeom prst="rect">
+            <a:avLst/>
+          </a:prstGeom>
+          <a:noFill/>
+        </p:spPr>
+        <p:txBody>
+          <a:bodyPr wrap="square" rtlCol="0">
+            <a:spAutoFit/>
+          </a:bodyPr>
+          <a:lstStyle/>
+          <a:p>
+            <a:r>
+              <a:rPr lang="en-US" dirty="0"/>
+              <a:t>(A) breakdown of space into a hierarchy, differentiating regional, node-based, and road segment-based decision-making; (B) an example route choice process, where different heuristic rule sets are engaged at each level of the hierarchy</a:t>
+            </a:r>
+          </a:p>
+          <a:p>
+            <a:endParaRPr lang="en-US" dirty="0"/>
+          </a:p>
+          <a:p>
+            <a:endParaRPr lang="en-US" dirty="0"/>
+          </a:p>
+        </p:txBody>
+      </p:sp>
+    </p:spTree>
+    <p:extLst>
+      <p:ext uri="{BB962C8B-B14F-4D97-AF65-F5344CB8AC3E}">
+        <p14:creationId xmlns:p14="http://schemas.microsoft.com/office/powerpoint/2010/main" val="1582129163"/>
+      </p:ext>
+    </p:extLst>
+  </p:cSld>
+  <p:clrMapOvr>
+    <a:masterClrMapping/>
+  </p:clrMapOvr>
+</p:sld>
+</file>
+
+<file path=ppt/slides/slide9.xml><?xml version="1.0" encoding="utf-8"?>
+<p:sld xmlns:a="http://schemas.openxmlformats.org/drawingml/2006/main" xmlns:r="http://schemas.openxmlformats.org/officeDocument/2006/relationships" xmlns:p="http://schemas.openxmlformats.org/presentationml/2006/main">
+  <p:cSld>
+    <p:spTree>
+      <p:nvGrpSpPr>
+        <p:cNvPr id="1" name=""/>
+        <p:cNvGrpSpPr/>
+        <p:nvPr/>
+      </p:nvGrpSpPr>
+      <p:grpSpPr>
+        <a:xfrm>
+          <a:off x="0" y="0"/>
+          <a:ext cx="0" cy="0"/>
+          <a:chOff x="0" y="0"/>
+          <a:chExt cx="0" cy="0"/>
+        </a:xfrm>
+      </p:grpSpPr>
+      <p:sp>
+        <p:nvSpPr>
+          <p:cNvPr id="2" name="Title 1">
+            <a:extLst>
+              <a:ext uri="{FF2B5EF4-FFF2-40B4-BE49-F238E27FC236}">
+                <a16:creationId xmlns:a16="http://schemas.microsoft.com/office/drawing/2014/main" id="{FC36D1DC-5510-7A4E-BF83-CC2C14FB8343}"/>
+              </a:ext>
+            </a:extLst>
+          </p:cNvPr>
+          <p:cNvSpPr>
+            <a:spLocks noGrp="1"/>
+          </p:cNvSpPr>
+          <p:nvPr>
+            <p:ph type="title"/>
+          </p:nvPr>
+        </p:nvSpPr>
+        <p:spPr/>
+        <p:txBody>
+          <a:bodyPr/>
+          <a:lstStyle/>
+          <a:p>
+            <a:r>
+              <a:rPr lang="en-US" dirty="0"/>
+              <a:t>Summary of customer group characteristics</a:t>
+            </a:r>
+          </a:p>
+        </p:txBody>
+      </p:sp>
+      <p:pic>
+        <p:nvPicPr>
+          <p:cNvPr id="5" name="Content Placeholder 4" descr="A screenshot of a cell phone&#10;&#10;Description automatically generated">
+            <a:extLst>
+              <a:ext uri="{FF2B5EF4-FFF2-40B4-BE49-F238E27FC236}">
+                <a16:creationId xmlns:a16="http://schemas.microsoft.com/office/drawing/2014/main" id="{82780041-0B4D-D94D-A0E8-6C8306094EA4}"/>
+              </a:ext>
+            </a:extLst>
+          </p:cNvPr>
+          <p:cNvPicPr>
+            <a:picLocks noGrp="1" noChangeAspect="1"/>
+          </p:cNvPicPr>
+          <p:nvPr>
+            <p:ph idx="1"/>
+          </p:nvPr>
+        </p:nvPicPr>
+        <p:blipFill>
+          <a:blip r:embed="rId2"/>
+          <a:stretch>
+            <a:fillRect/>
+          </a:stretch>
+        </p:blipFill>
+        <p:spPr>
+          <a:xfrm>
+            <a:off x="1866900" y="1690688"/>
+            <a:ext cx="8458200" cy="4887982"/>
+          </a:xfrm>
+        </p:spPr>
+      </p:pic>
+    </p:spTree>
+    <p:extLst>
+      <p:ext uri="{BB962C8B-B14F-4D97-AF65-F5344CB8AC3E}">
+        <p14:creationId xmlns:p14="http://schemas.microsoft.com/office/powerpoint/2010/main" val="2892769866"/>
       </p:ext>
     </p:extLst>
   </p:cSld>

</xml_diff>